<commit_message>
Revised Final Documentation, plus spell-checked Specifications and its presentation
This is a better version of the Final Documentation, with more content
and upgrades. I also re-spell checked the Specifications, and improved
the Specifications Presentation.
</commit_message>
<xml_diff>
--- a/Documentation/Specifications_PLUVALI_presentation.pptx
+++ b/Documentation/Specifications_PLUVALI_presentation.pptx
@@ -12,6 +12,7 @@
     <p:sldId id="259" r:id="rId7"/>
     <p:sldId id="260" r:id="rId8"/>
     <p:sldId id="261" r:id="rId9"/>
+    <p:sldId id="262" r:id="rId10"/>
   </p:sldIdLst>
   <p:sldSz cx="9144000" cy="6858000"/>
   <p:notesSz cx="7772400" cy="10058400"/>
@@ -2360,7 +2361,7 @@
         <p:spPr>
           <a:xfrm>
             <a:off x="0" y="1436040"/>
-            <a:ext cx="9143280" cy="45000"/>
+            <a:ext cx="9142920" cy="44640"/>
           </a:xfrm>
           <a:prstGeom prst="rect">
             <a:avLst/>
@@ -2382,7 +2383,7 @@
         <p:spPr>
           <a:xfrm>
             <a:off x="0" y="0"/>
-            <a:ext cx="9143280" cy="1433160"/>
+            <a:ext cx="9142920" cy="1432800"/>
           </a:xfrm>
           <a:prstGeom prst="rect">
             <a:avLst/>
@@ -2404,7 +2405,7 @@
         <p:spPr>
           <a:xfrm>
             <a:off x="0" y="0"/>
-            <a:ext cx="9143280" cy="5134680"/>
+            <a:ext cx="9142920" cy="5134320"/>
           </a:xfrm>
           <a:prstGeom prst="rect">
             <a:avLst/>
@@ -2426,7 +2427,7 @@
         <p:spPr>
           <a:xfrm>
             <a:off x="0" y="5128200"/>
-            <a:ext cx="9143280" cy="45000"/>
+            <a:ext cx="9142920" cy="44640"/>
           </a:xfrm>
           <a:prstGeom prst="rect">
             <a:avLst/>
@@ -2451,8 +2452,8 @@
         </p:nvSpPr>
         <p:spPr>
           <a:xfrm>
-            <a:off x="457200" y="155520"/>
-            <a:ext cx="8228880" cy="1252080"/>
+            <a:off x="457200" y="273600"/>
+            <a:ext cx="8228880" cy="1144800"/>
           </a:xfrm>
           <a:prstGeom prst="rect">
             <a:avLst/>
@@ -2484,7 +2485,7 @@
         <p:spPr>
           <a:xfrm>
             <a:off x="457200" y="1604520"/>
-            <a:ext cx="8229240" cy="3977280"/>
+            <a:ext cx="8228880" cy="3976920"/>
           </a:xfrm>
           <a:prstGeom prst="rect">
             <a:avLst/>
@@ -2499,7 +2500,7 @@
               <a:buChar char=""/>
             </a:pPr>
             <a:r>
-              <a:rPr lang="en-US" sz="3200">
+              <a:rPr lang="en-US">
                 <a:latin typeface="Arial"/>
               </a:rPr>
               <a:t>Click to edit the outline text format</a:t>
@@ -2513,7 +2514,7 @@
               <a:buChar char=""/>
             </a:pPr>
             <a:r>
-              <a:rPr lang="en-US" sz="2800">
+              <a:rPr lang="en-US">
                 <a:latin typeface="Arial"/>
               </a:rPr>
               <a:t>Second Outline Level</a:t>
@@ -2527,7 +2528,7 @@
               <a:buChar char=""/>
             </a:pPr>
             <a:r>
-              <a:rPr lang="en-US" sz="2400">
+              <a:rPr lang="en-US">
                 <a:latin typeface="Arial"/>
               </a:rPr>
               <a:t>Third Outline Level</a:t>
@@ -2541,7 +2542,7 @@
               <a:buChar char=""/>
             </a:pPr>
             <a:r>
-              <a:rPr lang="en-US" sz="2000">
+              <a:rPr lang="en-US">
                 <a:latin typeface="Arial"/>
               </a:rPr>
               <a:t>Fourth Outline Level</a:t>
@@ -2555,7 +2556,7 @@
               <a:buChar char=""/>
             </a:pPr>
             <a:r>
-              <a:rPr lang="en-US" sz="2000">
+              <a:rPr lang="en-US">
                 <a:latin typeface="Arial"/>
               </a:rPr>
               <a:t>Fifth Outline Level</a:t>
@@ -2569,7 +2570,7 @@
               <a:buChar char=""/>
             </a:pPr>
             <a:r>
-              <a:rPr lang="en-US" sz="2000">
+              <a:rPr lang="en-US">
                 <a:latin typeface="Arial"/>
               </a:rPr>
               <a:t>Sixth Outline Level</a:t>
@@ -2583,7 +2584,7 @@
               <a:buChar char=""/>
             </a:pPr>
             <a:r>
-              <a:rPr lang="en-US" sz="2000">
+              <a:rPr lang="en-US">
                 <a:latin typeface="Arial"/>
               </a:rPr>
               <a:t>Seventh Outline Level</a:t>
@@ -2645,7 +2646,7 @@
         <p:spPr>
           <a:xfrm>
             <a:off x="0" y="1436040"/>
-            <a:ext cx="9143280" cy="45000"/>
+            <a:ext cx="9142920" cy="44640"/>
           </a:xfrm>
           <a:prstGeom prst="rect">
             <a:avLst/>
@@ -2667,7 +2668,7 @@
         <p:spPr>
           <a:xfrm>
             <a:off x="0" y="0"/>
-            <a:ext cx="9143280" cy="1433160"/>
+            <a:ext cx="9142920" cy="1432800"/>
           </a:xfrm>
           <a:prstGeom prst="rect">
             <a:avLst/>
@@ -2880,7 +2881,7 @@
         <p:spPr>
           <a:xfrm>
             <a:off x="685800" y="2895480"/>
-            <a:ext cx="7771680" cy="1469160"/>
+            <a:ext cx="7771320" cy="1468800"/>
           </a:xfrm>
           <a:prstGeom prst="rect">
             <a:avLst/>
@@ -3010,7 +3011,7 @@
         <p:spPr>
           <a:xfrm>
             <a:off x="2514600" y="685800"/>
-            <a:ext cx="4114080" cy="699480"/>
+            <a:ext cx="4113720" cy="699120"/>
           </a:xfrm>
           <a:prstGeom prst="rect">
             <a:avLst/>
@@ -3100,7 +3101,7 @@
         <p:spPr>
           <a:xfrm>
             <a:off x="457200" y="155520"/>
-            <a:ext cx="8228880" cy="1252080"/>
+            <a:ext cx="8228520" cy="1251720"/>
           </a:xfrm>
           <a:prstGeom prst="rect">
             <a:avLst/>
@@ -3140,7 +3141,7 @@
         <p:spPr>
           <a:xfrm>
             <a:off x="457200" y="1447920"/>
-            <a:ext cx="8228880" cy="4876200"/>
+            <a:ext cx="8228520" cy="4875840"/>
           </a:xfrm>
           <a:prstGeom prst="rect">
             <a:avLst/>
@@ -3195,7 +3196,7 @@
         <p:spPr>
           <a:xfrm>
             <a:off x="274320" y="1737360"/>
-            <a:ext cx="8869320" cy="4663080"/>
+            <a:ext cx="8868960" cy="4662720"/>
           </a:xfrm>
           <a:prstGeom prst="rect">
             <a:avLst/>
@@ -3319,7 +3320,7 @@
         <p:spPr>
           <a:xfrm>
             <a:off x="457200" y="155520"/>
-            <a:ext cx="8228880" cy="1252080"/>
+            <a:ext cx="8228520" cy="1251720"/>
           </a:xfrm>
           <a:prstGeom prst="rect">
             <a:avLst/>
@@ -3359,7 +3360,7 @@
         <p:spPr>
           <a:xfrm>
             <a:off x="457200" y="1775160"/>
-            <a:ext cx="8228880" cy="4624920"/>
+            <a:ext cx="8228520" cy="4624560"/>
           </a:xfrm>
           <a:prstGeom prst="rect">
             <a:avLst/>
@@ -3471,7 +3472,7 @@
         <p:spPr>
           <a:xfrm>
             <a:off x="457200" y="155520"/>
-            <a:ext cx="8228880" cy="1252080"/>
+            <a:ext cx="8228520" cy="1251720"/>
           </a:xfrm>
           <a:prstGeom prst="rect">
             <a:avLst/>
@@ -3512,7 +3513,7 @@
         <p:spPr>
           <a:xfrm>
             <a:off x="457200" y="1600200"/>
-            <a:ext cx="8229240" cy="4952520"/>
+            <a:ext cx="8228880" cy="4952160"/>
           </a:xfrm>
           <a:prstGeom prst="rect">
             <a:avLst/>
@@ -4015,7 +4016,7 @@
         <p:spPr>
           <a:xfrm>
             <a:off x="457200" y="155520"/>
-            <a:ext cx="8228880" cy="1252080"/>
+            <a:ext cx="8228520" cy="1251720"/>
           </a:xfrm>
           <a:prstGeom prst="rect">
             <a:avLst/>
@@ -4055,7 +4056,7 @@
         <p:spPr>
           <a:xfrm>
             <a:off x="457200" y="1775160"/>
-            <a:ext cx="8228880" cy="4624920"/>
+            <a:ext cx="8228520" cy="4624560"/>
           </a:xfrm>
           <a:prstGeom prst="rect">
             <a:avLst/>
@@ -4400,7 +4401,7 @@
         <p:spPr>
           <a:xfrm>
             <a:off x="457200" y="155520"/>
-            <a:ext cx="8228880" cy="1252080"/>
+            <a:ext cx="8228520" cy="1251720"/>
           </a:xfrm>
           <a:prstGeom prst="rect">
             <a:avLst/>
@@ -4440,7 +4441,7 @@
         <p:spPr>
           <a:xfrm>
             <a:off x="457200" y="1775160"/>
-            <a:ext cx="8228880" cy="4624920"/>
+            <a:ext cx="8228520" cy="4624560"/>
           </a:xfrm>
           <a:prstGeom prst="rect">
             <a:avLst/>
@@ -4663,6 +4664,89 @@
       </p:par>
     </p:tnLst>
   </p:timing>
+</p:sld>
+</file>
+
+<file path=ppt/slides/slide7.xml><?xml version="1.0" encoding="utf-8"?>
+<p:sld xmlns:a="http://schemas.openxmlformats.org/drawingml/2006/main" xmlns:p="http://schemas.openxmlformats.org/presentationml/2006/main" xmlns:r="http://schemas.openxmlformats.org/officeDocument/2006/relationships">
+  <p:cSld>
+    <p:spTree>
+      <p:nvGrpSpPr>
+        <p:cNvPr id="1" name=""/>
+        <p:cNvGrpSpPr/>
+        <p:nvPr/>
+      </p:nvGrpSpPr>
+      <p:grpSpPr>
+        <a:xfrm>
+          <a:off x="0" y="0"/>
+          <a:ext cx="0" cy="0"/>
+          <a:chOff x="0" y="0"/>
+          <a:chExt cx="0" cy="0"/>
+        </a:xfrm>
+      </p:grpSpPr>
+      <p:sp>
+        <p:nvSpPr>
+          <p:cNvPr id="91" name="TextShape 1"/>
+          <p:cNvSpPr txBox="1"/>
+          <p:nvPr/>
+        </p:nvSpPr>
+        <p:spPr>
+          <a:xfrm>
+            <a:off x="274320" y="308520"/>
+            <a:ext cx="7536960" cy="788760"/>
+          </a:xfrm>
+          <a:prstGeom prst="rect">
+            <a:avLst/>
+          </a:prstGeom>
+        </p:spPr>
+        <p:txBody>
+          <a:bodyPr lIns="90000" rIns="90000" tIns="45000" bIns="45000"/>
+          <a:p>
+            <a:pPr>
+              <a:lnSpc>
+                <a:spcPct val="100000"/>
+              </a:lnSpc>
+            </a:pPr>
+            <a:r>
+              <a:rPr b="1" lang="en-US" sz="4500">
+                <a:solidFill>
+                  <a:srgbClr val="f0ad00"/>
+                </a:solidFill>
+                <a:latin typeface="Corbel"/>
+              </a:rPr>
+              <a:t>Data Flow Diagram:</a:t>
+            </a:r>
+            <a:endParaRPr/>
+          </a:p>
+        </p:txBody>
+      </p:sp>
+      <p:pic>
+        <p:nvPicPr>
+          <p:cNvPr id="92" name="" descr=""/>
+          <p:cNvPicPr/>
+          <p:nvPr/>
+        </p:nvPicPr>
+        <p:blipFill>
+          <a:blip r:embed="rId1"/>
+          <a:stretch>
+            <a:fillRect/>
+          </a:stretch>
+        </p:blipFill>
+        <p:spPr>
+          <a:xfrm>
+            <a:off x="980280" y="1554480"/>
+            <a:ext cx="7432200" cy="5120640"/>
+          </a:xfrm>
+          <a:prstGeom prst="rect">
+            <a:avLst/>
+          </a:prstGeom>
+          <a:ln>
+            <a:noFill/>
+          </a:ln>
+        </p:spPr>
+      </p:pic>
+    </p:spTree>
+  </p:cSld>
 </p:sld>
 </file>
 

</xml_diff>